<commit_message>
first full iteration finished
</commit_message>
<xml_diff>
--- a/loadbal.pptx
+++ b/loadbal.pptx
@@ -192,7 +192,7 @@
           <a:p>
             <a:fld id="{86094466-E15E-4393-BF68-9726D47EBD48}" type="datetimeFigureOut">
               <a:rPr lang="de-CH" smtClean="0"/>
-              <a:t>15.03.2015</a:t>
+              <a:t>29.03.2015</a:t>
             </a:fld>
             <a:endParaRPr lang="de-CH"/>
           </a:p>
@@ -725,7 +725,7 @@
           <a:p>
             <a:fld id="{EBCDFFF2-8927-4906-A981-3D2E8CD0C05F}" type="datetimeFigureOut">
               <a:rPr lang="de-CH" smtClean="0"/>
-              <a:t>15.03.2015</a:t>
+              <a:t>29.03.2015</a:t>
             </a:fld>
             <a:endParaRPr lang="de-CH"/>
           </a:p>
@@ -895,7 +895,7 @@
           <a:p>
             <a:fld id="{EBCDFFF2-8927-4906-A981-3D2E8CD0C05F}" type="datetimeFigureOut">
               <a:rPr lang="de-CH" smtClean="0"/>
-              <a:t>15.03.2015</a:t>
+              <a:t>29.03.2015</a:t>
             </a:fld>
             <a:endParaRPr lang="de-CH"/>
           </a:p>
@@ -1075,7 +1075,7 @@
           <a:p>
             <a:fld id="{EBCDFFF2-8927-4906-A981-3D2E8CD0C05F}" type="datetimeFigureOut">
               <a:rPr lang="de-CH" smtClean="0"/>
-              <a:t>15.03.2015</a:t>
+              <a:t>29.03.2015</a:t>
             </a:fld>
             <a:endParaRPr lang="de-CH"/>
           </a:p>
@@ -1245,7 +1245,7 @@
           <a:p>
             <a:fld id="{EBCDFFF2-8927-4906-A981-3D2E8CD0C05F}" type="datetimeFigureOut">
               <a:rPr lang="de-CH" smtClean="0"/>
-              <a:t>15.03.2015</a:t>
+              <a:t>29.03.2015</a:t>
             </a:fld>
             <a:endParaRPr lang="de-CH"/>
           </a:p>
@@ -1491,7 +1491,7 @@
           <a:p>
             <a:fld id="{EBCDFFF2-8927-4906-A981-3D2E8CD0C05F}" type="datetimeFigureOut">
               <a:rPr lang="de-CH" smtClean="0"/>
-              <a:t>15.03.2015</a:t>
+              <a:t>29.03.2015</a:t>
             </a:fld>
             <a:endParaRPr lang="de-CH"/>
           </a:p>
@@ -1779,7 +1779,7 @@
           <a:p>
             <a:fld id="{EBCDFFF2-8927-4906-A981-3D2E8CD0C05F}" type="datetimeFigureOut">
               <a:rPr lang="de-CH" smtClean="0"/>
-              <a:t>15.03.2015</a:t>
+              <a:t>29.03.2015</a:t>
             </a:fld>
             <a:endParaRPr lang="de-CH"/>
           </a:p>
@@ -2201,7 +2201,7 @@
           <a:p>
             <a:fld id="{EBCDFFF2-8927-4906-A981-3D2E8CD0C05F}" type="datetimeFigureOut">
               <a:rPr lang="de-CH" smtClean="0"/>
-              <a:t>15.03.2015</a:t>
+              <a:t>29.03.2015</a:t>
             </a:fld>
             <a:endParaRPr lang="de-CH"/>
           </a:p>
@@ -2319,7 +2319,7 @@
           <a:p>
             <a:fld id="{EBCDFFF2-8927-4906-A981-3D2E8CD0C05F}" type="datetimeFigureOut">
               <a:rPr lang="de-CH" smtClean="0"/>
-              <a:t>15.03.2015</a:t>
+              <a:t>29.03.2015</a:t>
             </a:fld>
             <a:endParaRPr lang="de-CH"/>
           </a:p>
@@ -2414,7 +2414,7 @@
           <a:p>
             <a:fld id="{EBCDFFF2-8927-4906-A981-3D2E8CD0C05F}" type="datetimeFigureOut">
               <a:rPr lang="de-CH" smtClean="0"/>
-              <a:t>15.03.2015</a:t>
+              <a:t>29.03.2015</a:t>
             </a:fld>
             <a:endParaRPr lang="de-CH"/>
           </a:p>
@@ -2691,7 +2691,7 @@
           <a:p>
             <a:fld id="{EBCDFFF2-8927-4906-A981-3D2E8CD0C05F}" type="datetimeFigureOut">
               <a:rPr lang="de-CH" smtClean="0"/>
-              <a:t>15.03.2015</a:t>
+              <a:t>29.03.2015</a:t>
             </a:fld>
             <a:endParaRPr lang="de-CH"/>
           </a:p>
@@ -2944,7 +2944,7 @@
           <a:p>
             <a:fld id="{EBCDFFF2-8927-4906-A981-3D2E8CD0C05F}" type="datetimeFigureOut">
               <a:rPr lang="de-CH" smtClean="0"/>
-              <a:t>15.03.2015</a:t>
+              <a:t>29.03.2015</a:t>
             </a:fld>
             <a:endParaRPr lang="de-CH"/>
           </a:p>
@@ -3157,7 +3157,7 @@
           <a:p>
             <a:fld id="{EBCDFFF2-8927-4906-A981-3D2E8CD0C05F}" type="datetimeFigureOut">
               <a:rPr lang="de-CH" smtClean="0"/>
-              <a:t>15.03.2015</a:t>
+              <a:t>29.03.2015</a:t>
             </a:fld>
             <a:endParaRPr lang="de-CH"/>
           </a:p>
@@ -4084,8 +4084,8 @@
         </p:nvSpPr>
         <p:spPr>
           <a:xfrm>
-            <a:off x="862911" y="2898566"/>
-            <a:ext cx="441146" cy="400110"/>
+            <a:off x="496405" y="2954780"/>
+            <a:ext cx="867545" cy="400110"/>
           </a:xfrm>
           <a:prstGeom prst="rect">
             <a:avLst/>
@@ -4103,7 +4103,7 @@
                 <a:latin typeface="Times New Roman" panose="02020603050405020304" pitchFamily="18" charset="0"/>
                 <a:cs typeface="Times New Roman" panose="02020603050405020304" pitchFamily="18" charset="0"/>
               </a:rPr>
-              <a:t>0*</a:t>
+              <a:t>update</a:t>
             </a:r>
             <a:endParaRPr lang="de-CH" sz="2000" dirty="0">
               <a:latin typeface="Times New Roman" panose="02020603050405020304" pitchFamily="18" charset="0"/>
@@ -4637,50 +4637,14 @@
       </p:cxnSp>
       <p:sp>
         <p:nvSpPr>
-          <p:cNvPr id="54" name="TextBox 53"/>
-          <p:cNvSpPr txBox="1"/>
-          <p:nvPr/>
-        </p:nvSpPr>
-        <p:spPr>
-          <a:xfrm>
-            <a:off x="2666428" y="2898566"/>
-            <a:ext cx="441146" cy="400110"/>
-          </a:xfrm>
-          <a:prstGeom prst="rect">
-            <a:avLst/>
-          </a:prstGeom>
-          <a:noFill/>
-        </p:spPr>
-        <p:txBody>
-          <a:bodyPr wrap="none" rtlCol="0">
-            <a:spAutoFit/>
-          </a:bodyPr>
-          <a:lstStyle/>
-          <a:p>
-            <a:r>
-              <a:rPr lang="de-CH" sz="2000" dirty="0" smtClean="0">
-                <a:latin typeface="Times New Roman" panose="02020603050405020304" pitchFamily="18" charset="0"/>
-                <a:cs typeface="Times New Roman" panose="02020603050405020304" pitchFamily="18" charset="0"/>
-              </a:rPr>
-              <a:t>1*</a:t>
-            </a:r>
-            <a:endParaRPr lang="de-CH" sz="2000" dirty="0">
-              <a:latin typeface="Times New Roman" panose="02020603050405020304" pitchFamily="18" charset="0"/>
-              <a:cs typeface="Times New Roman" panose="02020603050405020304" pitchFamily="18" charset="0"/>
-            </a:endParaRPr>
-          </a:p>
-        </p:txBody>
-      </p:sp>
-      <p:sp>
-        <p:nvSpPr>
           <p:cNvPr id="55" name="Freeform 54"/>
           <p:cNvSpPr/>
           <p:nvPr/>
         </p:nvSpPr>
         <p:spPr>
-          <a:xfrm>
-            <a:off x="569305" y="3915950"/>
-            <a:ext cx="8042314" cy="1168399"/>
+          <a:xfrm flipV="1">
+            <a:off x="569305" y="5084349"/>
+            <a:ext cx="8042314" cy="1296979"/>
           </a:xfrm>
           <a:custGeom>
             <a:avLst/>
@@ -4786,9 +4750,9 @@
           <p:nvPr/>
         </p:nvSpPr>
         <p:spPr>
-          <a:xfrm>
-            <a:off x="544084" y="4276825"/>
-            <a:ext cx="8042314" cy="1168399"/>
+          <a:xfrm flipV="1">
+            <a:off x="544084" y="5445224"/>
+            <a:ext cx="8042314" cy="1152128"/>
           </a:xfrm>
           <a:custGeom>
             <a:avLst/>
@@ -4884,6 +4848,150 @@
           <a:p>
             <a:pPr algn="ctr"/>
             <a:endParaRPr lang="de-CH"/>
+          </a:p>
+        </p:txBody>
+      </p:sp>
+      <p:sp>
+        <p:nvSpPr>
+          <p:cNvPr id="24" name="Freeform 23"/>
+          <p:cNvSpPr/>
+          <p:nvPr/>
+        </p:nvSpPr>
+        <p:spPr>
+          <a:xfrm flipV="1">
+            <a:off x="478835" y="4815772"/>
+            <a:ext cx="8042314" cy="1258903"/>
+          </a:xfrm>
+          <a:custGeom>
+            <a:avLst/>
+            <a:gdLst>
+              <a:gd name="connsiteX0" fmla="*/ 0 w 8042314"/>
+              <a:gd name="connsiteY0" fmla="*/ 969487 h 1168399"/>
+              <a:gd name="connsiteX1" fmla="*/ 1663547 w 8042314"/>
+              <a:gd name="connsiteY1" fmla="*/ 991521 h 1168399"/>
+              <a:gd name="connsiteX2" fmla="*/ 3470314 w 8042314"/>
+              <a:gd name="connsiteY2" fmla="*/ 3 h 1168399"/>
+              <a:gd name="connsiteX3" fmla="*/ 6235547 w 8042314"/>
+              <a:gd name="connsiteY3" fmla="*/ 1002538 h 1168399"/>
+              <a:gd name="connsiteX4" fmla="*/ 8042314 w 8042314"/>
+              <a:gd name="connsiteY4" fmla="*/ 1156774 h 1168399"/>
+            </a:gdLst>
+            <a:ahLst/>
+            <a:cxnLst>
+              <a:cxn ang="0">
+                <a:pos x="connsiteX0" y="connsiteY0"/>
+              </a:cxn>
+              <a:cxn ang="0">
+                <a:pos x="connsiteX1" y="connsiteY1"/>
+              </a:cxn>
+              <a:cxn ang="0">
+                <a:pos x="connsiteX2" y="connsiteY2"/>
+              </a:cxn>
+              <a:cxn ang="0">
+                <a:pos x="connsiteX3" y="connsiteY3"/>
+              </a:cxn>
+              <a:cxn ang="0">
+                <a:pos x="connsiteX4" y="connsiteY4"/>
+              </a:cxn>
+            </a:cxnLst>
+            <a:rect l="l" t="t" r="r" b="b"/>
+            <a:pathLst>
+              <a:path w="8042314" h="1168399">
+                <a:moveTo>
+                  <a:pt x="0" y="969487"/>
+                </a:moveTo>
+                <a:cubicBezTo>
+                  <a:pt x="542580" y="1061294"/>
+                  <a:pt x="1085161" y="1153102"/>
+                  <a:pt x="1663547" y="991521"/>
+                </a:cubicBezTo>
+                <a:cubicBezTo>
+                  <a:pt x="2241933" y="829940"/>
+                  <a:pt x="2708314" y="-1833"/>
+                  <a:pt x="3470314" y="3"/>
+                </a:cubicBezTo>
+                <a:cubicBezTo>
+                  <a:pt x="4232314" y="1839"/>
+                  <a:pt x="5473547" y="809743"/>
+                  <a:pt x="6235547" y="1002538"/>
+                </a:cubicBezTo>
+                <a:cubicBezTo>
+                  <a:pt x="6997547" y="1195333"/>
+                  <a:pt x="7519930" y="1176053"/>
+                  <a:pt x="8042314" y="1156774"/>
+                </a:cubicBezTo>
+              </a:path>
+            </a:pathLst>
+          </a:custGeom>
+          <a:noFill/>
+          <a:ln w="76200">
+            <a:solidFill>
+              <a:schemeClr val="accent6">
+                <a:lumMod val="75000"/>
+              </a:schemeClr>
+            </a:solidFill>
+            <a:headEnd type="none" w="med" len="med"/>
+            <a:tailEnd type="arrow" w="med" len="med"/>
+          </a:ln>
+        </p:spPr>
+        <p:style>
+          <a:lnRef idx="2">
+            <a:schemeClr val="accent1">
+              <a:shade val="50000"/>
+            </a:schemeClr>
+          </a:lnRef>
+          <a:fillRef idx="1">
+            <a:schemeClr val="accent1"/>
+          </a:fillRef>
+          <a:effectRef idx="0">
+            <a:schemeClr val="accent1"/>
+          </a:effectRef>
+          <a:fontRef idx="minor">
+            <a:schemeClr val="lt1"/>
+          </a:fontRef>
+        </p:style>
+        <p:txBody>
+          <a:bodyPr rtlCol="0" anchor="ctr"/>
+          <a:lstStyle/>
+          <a:p>
+            <a:pPr algn="ctr"/>
+            <a:endParaRPr lang="de-CH"/>
+          </a:p>
+        </p:txBody>
+      </p:sp>
+      <p:sp>
+        <p:nvSpPr>
+          <p:cNvPr id="30" name="TextBox 29"/>
+          <p:cNvSpPr txBox="1"/>
+          <p:nvPr/>
+        </p:nvSpPr>
+        <p:spPr>
+          <a:xfrm>
+            <a:off x="2256469" y="2954780"/>
+            <a:ext cx="867545" cy="400110"/>
+          </a:xfrm>
+          <a:prstGeom prst="rect">
+            <a:avLst/>
+          </a:prstGeom>
+          <a:noFill/>
+        </p:spPr>
+        <p:txBody>
+          <a:bodyPr wrap="none" rtlCol="0">
+            <a:spAutoFit/>
+          </a:bodyPr>
+          <a:lstStyle/>
+          <a:p>
+            <a:r>
+              <a:rPr lang="de-CH" sz="2000" dirty="0" smtClean="0">
+                <a:latin typeface="Times New Roman" panose="02020603050405020304" pitchFamily="18" charset="0"/>
+                <a:cs typeface="Times New Roman" panose="02020603050405020304" pitchFamily="18" charset="0"/>
+              </a:rPr>
+              <a:t>update</a:t>
+            </a:r>
+            <a:endParaRPr lang="de-CH" sz="2000" dirty="0">
+              <a:latin typeface="Times New Roman" panose="02020603050405020304" pitchFamily="18" charset="0"/>
+              <a:cs typeface="Times New Roman" panose="02020603050405020304" pitchFamily="18" charset="0"/>
+            </a:endParaRPr>
           </a:p>
         </p:txBody>
       </p:sp>

</xml_diff>